<commit_message>
refactored docs a bit
</commit_message>
<xml_diff>
--- a/Licenta2018DomnaruAlexandru/Prezentare.pptx
+++ b/Licenta2018DomnaruAlexandru/Prezentare.pptx
@@ -225,7 +225,7 @@
           <a:p>
             <a:fld id="{20717945-59DC-4A2A-B5C8-9EC8422E2DB4}" type="datetimeFigureOut">
               <a:rPr lang="ro-RO" smtClean="0"/>
-              <a:t>11.02.2019</a:t>
+              <a:t>12.02.2019</a:t>
             </a:fld>
             <a:endParaRPr lang="ro-RO"/>
           </a:p>
@@ -3194,7 +3194,7 @@
             <a:fld id="{5586B75A-687E-405C-8A0B-8D00578BA2C3}" type="datetimeFigureOut">
               <a:rPr lang="en-US" dirty="0"/>
               <a:pPr/>
-              <a:t>2/11/2019</a:t>
+              <a:t>2/12/2019</a:t>
             </a:fld>
             <a:endParaRPr lang="en-US" dirty="0"/>
           </a:p>
@@ -3361,7 +3361,7 @@
             <a:fld id="{5586B75A-687E-405C-8A0B-8D00578BA2C3}" type="datetimeFigureOut">
               <a:rPr lang="en-US" dirty="0"/>
               <a:pPr/>
-              <a:t>2/11/2019</a:t>
+              <a:t>2/12/2019</a:t>
             </a:fld>
             <a:endParaRPr lang="en-US" dirty="0"/>
           </a:p>
@@ -3538,7 +3538,7 @@
             <a:fld id="{5586B75A-687E-405C-8A0B-8D00578BA2C3}" type="datetimeFigureOut">
               <a:rPr lang="en-US" dirty="0"/>
               <a:pPr/>
-              <a:t>2/11/2019</a:t>
+              <a:t>2/12/2019</a:t>
             </a:fld>
             <a:endParaRPr lang="en-US" dirty="0"/>
           </a:p>
@@ -3705,7 +3705,7 @@
             <a:fld id="{5586B75A-687E-405C-8A0B-8D00578BA2C3}" type="datetimeFigureOut">
               <a:rPr lang="en-US" dirty="0"/>
               <a:pPr/>
-              <a:t>2/11/2019</a:t>
+              <a:t>2/12/2019</a:t>
             </a:fld>
             <a:endParaRPr lang="en-US" dirty="0"/>
           </a:p>
@@ -3960,7 +3960,7 @@
             <a:fld id="{5586B75A-687E-405C-8A0B-8D00578BA2C3}" type="datetimeFigureOut">
               <a:rPr lang="en-US" dirty="0"/>
               <a:pPr/>
-              <a:t>2/11/2019</a:t>
+              <a:t>2/12/2019</a:t>
             </a:fld>
             <a:endParaRPr lang="en-US" dirty="0"/>
           </a:p>
@@ -4245,7 +4245,7 @@
             <a:fld id="{5586B75A-687E-405C-8A0B-8D00578BA2C3}" type="datetimeFigureOut">
               <a:rPr lang="en-US" dirty="0"/>
               <a:pPr/>
-              <a:t>2/11/2019</a:t>
+              <a:t>2/12/2019</a:t>
             </a:fld>
             <a:endParaRPr lang="en-US" dirty="0"/>
           </a:p>
@@ -4684,7 +4684,7 @@
             <a:fld id="{5586B75A-687E-405C-8A0B-8D00578BA2C3}" type="datetimeFigureOut">
               <a:rPr lang="en-US" dirty="0"/>
               <a:pPr/>
-              <a:t>2/11/2019</a:t>
+              <a:t>2/12/2019</a:t>
             </a:fld>
             <a:endParaRPr lang="en-US" dirty="0"/>
           </a:p>
@@ -4799,7 +4799,7 @@
             <a:fld id="{5586B75A-687E-405C-8A0B-8D00578BA2C3}" type="datetimeFigureOut">
               <a:rPr lang="en-US" dirty="0"/>
               <a:pPr/>
-              <a:t>2/11/2019</a:t>
+              <a:t>2/12/2019</a:t>
             </a:fld>
             <a:endParaRPr lang="en-US" dirty="0"/>
           </a:p>
@@ -4891,7 +4891,7 @@
             <a:fld id="{5586B75A-687E-405C-8A0B-8D00578BA2C3}" type="datetimeFigureOut">
               <a:rPr lang="en-US" dirty="0"/>
               <a:pPr/>
-              <a:t>2/11/2019</a:t>
+              <a:t>2/12/2019</a:t>
             </a:fld>
             <a:endParaRPr lang="en-US" dirty="0"/>
           </a:p>
@@ -5176,7 +5176,7 @@
             <a:fld id="{5586B75A-687E-405C-8A0B-8D00578BA2C3}" type="datetimeFigureOut">
               <a:rPr lang="en-US" dirty="0"/>
               <a:pPr/>
-              <a:t>2/11/2019</a:t>
+              <a:t>2/12/2019</a:t>
             </a:fld>
             <a:endParaRPr lang="en-US" dirty="0"/>
           </a:p>
@@ -5446,7 +5446,7 @@
             <a:fld id="{5586B75A-687E-405C-8A0B-8D00578BA2C3}" type="datetimeFigureOut">
               <a:rPr lang="en-US" dirty="0"/>
               <a:pPr/>
-              <a:t>2/11/2019</a:t>
+              <a:t>2/12/2019</a:t>
             </a:fld>
             <a:endParaRPr lang="en-US" dirty="0"/>
           </a:p>
@@ -5740,7 +5740,7 @@
             <a:fld id="{5586B75A-687E-405C-8A0B-8D00578BA2C3}" type="datetimeFigureOut">
               <a:rPr lang="en-US" dirty="0"/>
               <a:pPr/>
-              <a:t>2/11/2019</a:t>
+              <a:t>2/12/2019</a:t>
             </a:fld>
             <a:endParaRPr lang="en-US" dirty="0"/>
           </a:p>
@@ -6384,7 +6384,6 @@
               <a:rPr lang="ro-RO" dirty="0" smtClean="0"/>
               <a:t>Cu cât sunt folosiți mai mulți LSB, cu atât imaginea e mai distorsionată</a:t>
             </a:r>
-            <a:endParaRPr lang="ro-RO" dirty="0" smtClean="0"/>
           </a:p>
         </p:txBody>
       </p:sp>
@@ -6959,13 +6958,8 @@
           <a:p>
             <a:r>
               <a:rPr lang="ro-RO" dirty="0" smtClean="0"/>
-              <a:t>Imaginea este parcursă în blocuri de câte 2 </a:t>
-            </a:r>
-            <a:r>
-              <a:rPr lang="ro-RO" dirty="0" smtClean="0"/>
-              <a:t>pixeli consecutivi</a:t>
-            </a:r>
-            <a:endParaRPr lang="ro-RO" dirty="0" smtClean="0"/>
+              <a:t>Imaginea este parcursă în blocuri de câte 2 pixeli consecutivi</a:t>
+            </a:r>
           </a:p>
           <a:p>
             <a:r>
@@ -7040,8 +7034,8 @@
           </a:p>
         </p:txBody>
       </p:sp>
-      <mc:AlternateContent xmlns:mc="http://schemas.openxmlformats.org/markup-compatibility/2006">
-        <mc:Choice xmlns:a14="http://schemas.microsoft.com/office/drawing/2010/main" Requires="a14">
+      <mc:AlternateContent xmlns:mc="http://schemas.openxmlformats.org/markup-compatibility/2006" xmlns:a14="http://schemas.microsoft.com/office/drawing/2010/main">
+        <mc:Choice Requires="a14">
           <p:sp>
             <p:nvSpPr>
               <p:cNvPr id="3" name="Content Placeholder 2"/>
@@ -7069,11 +7063,7 @@
                 </a:r>
                 <a:r>
                   <a:rPr lang="ro-RO" dirty="0" smtClean="0"/>
-                  <a:t>dintre </a:t>
-                </a:r>
-                <a:r>
-                  <a:rPr lang="ro-RO" dirty="0" smtClean="0"/>
-                  <a:t>cei 2 pixeli ai blocului</a:t>
+                  <a:t>dintre cei 2 pixeli ai blocului</a:t>
                 </a:r>
               </a:p>
               <a:p>
@@ -7143,15 +7133,7 @@
               <a:p>
                 <a:r>
                   <a:rPr lang="ro-RO" dirty="0" smtClean="0"/>
-                  <a:t>Diferența este clasificată </a:t>
-                </a:r>
-                <a:r>
-                  <a:rPr lang="ro-RO" dirty="0" smtClean="0"/>
-                  <a:t>după o mulțime de </a:t>
-                </a:r>
-                <a:r>
-                  <a:rPr lang="ro-RO" dirty="0" smtClean="0"/>
-                  <a:t>intervale</a:t>
+                  <a:t>Diferența este clasificată după o mulțime de intervale</a:t>
                 </a:r>
                 <a:endParaRPr lang="en-GB" dirty="0" smtClean="0"/>
               </a:p>
@@ -7449,15 +7431,7 @@
                 <a:pPr lvl="1"/>
                 <a:r>
                   <a:rPr lang="ro-RO" dirty="0" smtClean="0"/>
-                  <a:t>Intervalele utilizate în </a:t>
-                </a:r>
-                <a:r>
-                  <a:rPr lang="ro-RO" dirty="0" smtClean="0"/>
-                  <a:t>algoritmi </a:t>
-                </a:r>
-                <a:r>
-                  <a:rPr lang="ro-RO" dirty="0" smtClean="0"/>
-                  <a:t>sunt următoarele:</a:t>
+                  <a:t>Intervalele utilizate în algoritmi sunt următoarele:</a:t>
                 </a:r>
               </a:p>
               <a:p>
@@ -8177,7 +8151,7 @@
             </p:txBody>
           </p:sp>
         </mc:Choice>
-        <mc:Fallback>
+        <mc:Fallback xmlns="">
           <p:sp>
             <p:nvSpPr>
               <p:cNvPr id="3" name="Content Placeholder 2"/>
@@ -8275,8 +8249,8 @@
           </a:p>
         </p:txBody>
       </p:sp>
-      <mc:AlternateContent xmlns:mc="http://schemas.openxmlformats.org/markup-compatibility/2006">
-        <mc:Choice xmlns:a14="http://schemas.microsoft.com/office/drawing/2010/main" Requires="a14">
+      <mc:AlternateContent xmlns:mc="http://schemas.openxmlformats.org/markup-compatibility/2006" xmlns:a14="http://schemas.microsoft.com/office/drawing/2010/main">
+        <mc:Choice Requires="a14">
           <p:sp>
             <p:nvSpPr>
               <p:cNvPr id="3" name="Content Placeholder 2"/>
@@ -8308,11 +8282,15 @@
                     </m:oMathParaPr>
                     <m:oMath xmlns:m="http://schemas.openxmlformats.org/officeDocument/2006/math">
                       <m:r>
-                        <a:rPr lang="ro-RO" i="1"/>
+                        <a:rPr lang="ro-RO" i="1">
+                          <a:latin typeface="Cambria Math" panose="02040503050406030204" pitchFamily="18" charset="0"/>
+                        </a:rPr>
                         <m:t>𝑑</m:t>
                       </m:r>
                       <m:r>
-                        <a:rPr lang="ro-RO" i="1"/>
+                        <a:rPr lang="ro-RO" i="1">
+                          <a:latin typeface="Cambria Math" panose="02040503050406030204" pitchFamily="18" charset="0"/>
+                        </a:rPr>
                         <m:t>’ = </m:t>
                       </m:r>
                       <m:d>
@@ -8320,54 +8298,74 @@
                           <m:begChr m:val="{"/>
                           <m:endChr m:val=""/>
                           <m:ctrlPr>
-                            <a:rPr lang="ro-RO" i="1"/>
+                            <a:rPr lang="ro-RO" i="1">
+                              <a:latin typeface="Cambria Math" panose="02040503050406030204" pitchFamily="18" charset="0"/>
+                            </a:rPr>
                           </m:ctrlPr>
                         </m:dPr>
                         <m:e>
                           <m:eqArr>
                             <m:eqArrPr>
                               <m:ctrlPr>
-                                <a:rPr lang="ro-RO" i="1"/>
+                                <a:rPr lang="ro-RO" i="1">
+                                  <a:latin typeface="Cambria Math" panose="02040503050406030204" pitchFamily="18" charset="0"/>
+                                </a:rPr>
                               </m:ctrlPr>
                             </m:eqArrPr>
                             <m:e>
                               <m:sSub>
                                 <m:sSubPr>
                                   <m:ctrlPr>
-                                    <a:rPr lang="ro-RO" i="1"/>
+                                    <a:rPr lang="ro-RO" i="1">
+                                      <a:latin typeface="Cambria Math" panose="02040503050406030204" pitchFamily="18" charset="0"/>
+                                    </a:rPr>
                                   </m:ctrlPr>
                                 </m:sSubPr>
                                 <m:e>
                                   <m:r>
-                                    <a:rPr lang="ro-RO" i="1"/>
+                                    <a:rPr lang="ro-RO" i="1">
+                                      <a:latin typeface="Cambria Math" panose="02040503050406030204" pitchFamily="18" charset="0"/>
+                                    </a:rPr>
                                     <m:t>𝑙</m:t>
                                   </m:r>
                                 </m:e>
                                 <m:sub>
                                   <m:r>
-                                    <a:rPr lang="ro-RO" i="1"/>
+                                    <a:rPr lang="ro-RO" i="1">
+                                      <a:latin typeface="Cambria Math" panose="02040503050406030204" pitchFamily="18" charset="0"/>
+                                    </a:rPr>
                                     <m:t>𝑘</m:t>
                                   </m:r>
                                 </m:sub>
                               </m:sSub>
                               <m:r>
-                                <a:rPr lang="ro-RO" i="1"/>
+                                <a:rPr lang="ro-RO" i="1">
+                                  <a:latin typeface="Cambria Math" panose="02040503050406030204" pitchFamily="18" charset="0"/>
+                                </a:rPr>
                                 <m:t>+</m:t>
                               </m:r>
                               <m:r>
-                                <a:rPr lang="ro-RO" i="1"/>
+                                <a:rPr lang="ro-RO" i="1">
+                                  <a:latin typeface="Cambria Math" panose="02040503050406030204" pitchFamily="18" charset="0"/>
+                                </a:rPr>
                                 <m:t>𝑏</m:t>
                               </m:r>
                               <m:r>
-                                <a:rPr lang="ro-RO" i="1"/>
+                                <a:rPr lang="ro-RO" i="1">
+                                  <a:latin typeface="Cambria Math" panose="02040503050406030204" pitchFamily="18" charset="0"/>
+                                </a:rPr>
                                 <m:t>,  </m:t>
                               </m:r>
                               <m:r>
-                                <a:rPr lang="ro-RO" i="1"/>
+                                <a:rPr lang="ro-RO" i="1">
+                                  <a:latin typeface="Cambria Math" panose="02040503050406030204" pitchFamily="18" charset="0"/>
+                                </a:rPr>
                                 <m:t>𝑑</m:t>
                               </m:r>
                               <m:r>
-                                <a:rPr lang="ro-RO" i="1"/>
+                                <a:rPr lang="ro-RO" i="1">
+                                  <a:latin typeface="Cambria Math" panose="02040503050406030204" pitchFamily="18" charset="0"/>
+                                </a:rPr>
                                 <m:t>≥0</m:t>
                               </m:r>
                             </m:e>
@@ -8375,50 +8373,70 @@
                               <m:sSub>
                                 <m:sSubPr>
                                   <m:ctrlPr>
-                                    <a:rPr lang="ro-RO" i="1"/>
+                                    <a:rPr lang="ro-RO" i="1">
+                                      <a:latin typeface="Cambria Math" panose="02040503050406030204" pitchFamily="18" charset="0"/>
+                                    </a:rPr>
                                   </m:ctrlPr>
                                 </m:sSubPr>
                                 <m:e>
                                   <m:r>
-                                    <a:rPr lang="ro-RO" i="1"/>
+                                    <a:rPr lang="ro-RO" i="1">
+                                      <a:latin typeface="Cambria Math" panose="02040503050406030204" pitchFamily="18" charset="0"/>
+                                    </a:rPr>
                                     <m:t>−(</m:t>
                                   </m:r>
                                   <m:r>
-                                    <a:rPr lang="ro-RO" i="1"/>
+                                    <a:rPr lang="ro-RO" i="1">
+                                      <a:latin typeface="Cambria Math" panose="02040503050406030204" pitchFamily="18" charset="0"/>
+                                    </a:rPr>
                                     <m:t>𝑙</m:t>
                                   </m:r>
                                 </m:e>
                                 <m:sub>
                                   <m:r>
-                                    <a:rPr lang="ro-RO" i="1"/>
+                                    <a:rPr lang="ro-RO" i="1">
+                                      <a:latin typeface="Cambria Math" panose="02040503050406030204" pitchFamily="18" charset="0"/>
+                                    </a:rPr>
                                     <m:t>𝑘</m:t>
                                   </m:r>
                                 </m:sub>
                               </m:sSub>
                               <m:r>
-                                <a:rPr lang="ro-RO" i="1"/>
+                                <a:rPr lang="ro-RO" i="1">
+                                  <a:latin typeface="Cambria Math" panose="02040503050406030204" pitchFamily="18" charset="0"/>
+                                </a:rPr>
                                 <m:t>+</m:t>
                               </m:r>
                               <m:r>
-                                <a:rPr lang="ro-RO" i="1"/>
+                                <a:rPr lang="ro-RO" i="1">
+                                  <a:latin typeface="Cambria Math" panose="02040503050406030204" pitchFamily="18" charset="0"/>
+                                </a:rPr>
                                 <m:t>𝑏</m:t>
                               </m:r>
                               <m:r>
-                                <a:rPr lang="ro-RO" i="1"/>
+                                <a:rPr lang="ro-RO" i="1">
+                                  <a:latin typeface="Cambria Math" panose="02040503050406030204" pitchFamily="18" charset="0"/>
+                                </a:rPr>
                                 <m:t>), </m:t>
                               </m:r>
                               <m:r>
-                                <a:rPr lang="ro-RO" i="1"/>
+                                <a:rPr lang="ro-RO" i="1">
+                                  <a:latin typeface="Cambria Math" panose="02040503050406030204" pitchFamily="18" charset="0"/>
+                                </a:rPr>
                                 <m:t>𝑑</m:t>
                               </m:r>
                               <m:r>
-                                <a:rPr lang="ro-RO" i="1"/>
+                                <a:rPr lang="ro-RO" i="1">
+                                  <a:latin typeface="Cambria Math" panose="02040503050406030204" pitchFamily="18" charset="0"/>
+                                </a:rPr>
                                 <m:t>&lt;0</m:t>
                               </m:r>
                             </m:e>
                           </m:eqArr>
                           <m:r>
-                            <a:rPr lang="ro-RO" i="1"/>
+                            <a:rPr lang="ro-RO" i="1">
+                              <a:latin typeface="Cambria Math" panose="02040503050406030204" pitchFamily="18" charset="0"/>
+                            </a:rPr>
                             <m:t>,  </m:t>
                           </m:r>
                         </m:e>
@@ -8445,47 +8463,69 @@
                     </m:oMathParaPr>
                     <m:oMath xmlns:m="http://schemas.openxmlformats.org/officeDocument/2006/math">
                       <m:r>
-                        <a:rPr lang="ro-RO" i="1"/>
+                        <a:rPr lang="ro-RO" i="1">
+                          <a:latin typeface="Cambria Math" panose="02040503050406030204" pitchFamily="18" charset="0"/>
+                        </a:rPr>
                         <m:t>𝑏</m:t>
                       </m:r>
                       <m:r>
-                        <a:rPr lang="ro-RO" i="1"/>
+                        <a:rPr lang="ro-RO" i="1">
+                          <a:latin typeface="Cambria Math" panose="02040503050406030204" pitchFamily="18" charset="0"/>
+                        </a:rPr>
                         <m:t>=</m:t>
                       </m:r>
                       <m:r>
-                        <a:rPr lang="ro-RO" i="1"/>
+                        <a:rPr lang="ro-RO" i="1">
+                          <a:latin typeface="Cambria Math" panose="02040503050406030204" pitchFamily="18" charset="0"/>
+                        </a:rPr>
                         <m:t>𝑣𝑎𝑙𝑜𝑎𝑟𝑒𝑎</m:t>
                       </m:r>
                       <m:r>
-                        <a:rPr lang="ro-RO" i="1"/>
+                        <a:rPr lang="ro-RO" i="1">
+                          <a:latin typeface="Cambria Math" panose="02040503050406030204" pitchFamily="18" charset="0"/>
+                        </a:rPr>
                         <m:t> </m:t>
                       </m:r>
                       <m:r>
-                        <a:rPr lang="ro-RO" i="1"/>
+                        <a:rPr lang="ro-RO" i="1">
+                          <a:latin typeface="Cambria Math" panose="02040503050406030204" pitchFamily="18" charset="0"/>
+                        </a:rPr>
                         <m:t>𝑠𝑢𝑏</m:t>
                       </m:r>
                       <m:r>
-                        <a:rPr lang="ro-RO" i="1"/>
+                        <a:rPr lang="ro-RO" i="1">
+                          <a:latin typeface="Cambria Math" panose="02040503050406030204" pitchFamily="18" charset="0"/>
+                        </a:rPr>
                         <m:t>ș</m:t>
                       </m:r>
                       <m:r>
-                        <a:rPr lang="ro-RO" i="1"/>
+                        <a:rPr lang="ro-RO" i="1">
+                          <a:latin typeface="Cambria Math" panose="02040503050406030204" pitchFamily="18" charset="0"/>
+                        </a:rPr>
                         <m:t>𝑖𝑟𝑢𝑙𝑢𝑖</m:t>
                       </m:r>
                       <m:r>
-                        <a:rPr lang="ro-RO" i="1"/>
+                        <a:rPr lang="ro-RO" i="1">
+                          <a:latin typeface="Cambria Math" panose="02040503050406030204" pitchFamily="18" charset="0"/>
+                        </a:rPr>
                         <m:t> </m:t>
                       </m:r>
                       <m:r>
-                        <a:rPr lang="ro-RO" i="1"/>
+                        <a:rPr lang="ro-RO" i="1">
+                          <a:latin typeface="Cambria Math" panose="02040503050406030204" pitchFamily="18" charset="0"/>
+                        </a:rPr>
                         <m:t>𝑑𝑖𝑛</m:t>
                       </m:r>
                       <m:r>
-                        <a:rPr lang="ro-RO" i="1"/>
+                        <a:rPr lang="ro-RO" i="1">
+                          <a:latin typeface="Cambria Math" panose="02040503050406030204" pitchFamily="18" charset="0"/>
+                        </a:rPr>
                         <m:t> </m:t>
                       </m:r>
                       <m:r>
-                        <a:rPr lang="ro-RO" i="1"/>
+                        <a:rPr lang="ro-RO" i="1">
+                          <a:latin typeface="Cambria Math" panose="02040503050406030204" pitchFamily="18" charset="0"/>
+                        </a:rPr>
                         <m:t>𝑆</m:t>
                       </m:r>
                     </m:oMath>
@@ -8496,7 +8536,7 @@
             </p:txBody>
           </p:sp>
         </mc:Choice>
-        <mc:Fallback>
+        <mc:Fallback xmlns="">
           <p:sp>
             <p:nvSpPr>
               <p:cNvPr id="3" name="Content Placeholder 2"/>
@@ -8594,8 +8634,8 @@
           </a:p>
         </p:txBody>
       </p:sp>
-      <mc:AlternateContent xmlns:mc="http://schemas.openxmlformats.org/markup-compatibility/2006">
-        <mc:Choice xmlns:a14="http://schemas.microsoft.com/office/drawing/2010/main" Requires="a14">
+      <mc:AlternateContent xmlns:mc="http://schemas.openxmlformats.org/markup-compatibility/2006" xmlns:a14="http://schemas.microsoft.com/office/drawing/2010/main">
+        <mc:Choice Requires="a14">
           <p:sp>
             <p:nvSpPr>
               <p:cNvPr id="3" name="Content Placeholder 2"/>
@@ -8647,20 +8687,26 @@
                     </m:oMathParaPr>
                     <m:oMath xmlns:m="http://schemas.openxmlformats.org/officeDocument/2006/math">
                       <m:r>
-                        <a:rPr lang="ro-RO" sz="1600" i="1"/>
+                        <a:rPr lang="ro-RO" sz="1600" i="1">
+                          <a:latin typeface="Cambria Math" panose="02040503050406030204" pitchFamily="18" charset="0"/>
+                        </a:rPr>
                         <m:t>𝑓</m:t>
                       </m:r>
                       <m:d>
                         <m:dPr>
                           <m:ctrlPr>
-                            <a:rPr lang="ro-RO" sz="1600" i="1"/>
+                            <a:rPr lang="ro-RO" sz="1600" i="1">
+                              <a:latin typeface="Cambria Math" panose="02040503050406030204" pitchFamily="18" charset="0"/>
+                            </a:rPr>
                           </m:ctrlPr>
                         </m:dPr>
                         <m:e>
                           <m:d>
                             <m:dPr>
                               <m:ctrlPr>
-                                <a:rPr lang="ro-RO" sz="1600" i="1"/>
+                                <a:rPr lang="ro-RO" sz="1600" i="1">
+                                  <a:latin typeface="Cambria Math" panose="02040503050406030204" pitchFamily="18" charset="0"/>
+                                </a:rPr>
                               </m:ctrlPr>
                             </m:dPr>
                             <m:e>
@@ -8729,17 +8775,23 @@
                             </m:e>
                           </m:d>
                           <m:r>
-                            <a:rPr lang="ro-RO" sz="1600" i="1"/>
+                            <a:rPr lang="ro-RO" sz="1600" i="1">
+                              <a:latin typeface="Cambria Math" panose="02040503050406030204" pitchFamily="18" charset="0"/>
+                            </a:rPr>
                             <m:t>, </m:t>
                           </m:r>
                           <m:r>
-                            <a:rPr lang="ro-RO" sz="1600" i="1"/>
+                            <a:rPr lang="ro-RO" sz="1600" i="1">
+                              <a:latin typeface="Cambria Math" panose="02040503050406030204" pitchFamily="18" charset="0"/>
+                            </a:rPr>
                             <m:t>𝑚</m:t>
                           </m:r>
                         </m:e>
                       </m:d>
                       <m:r>
-                        <a:rPr lang="ro-RO" sz="1600" i="1"/>
+                        <a:rPr lang="ro-RO" sz="1600" i="1">
+                          <a:latin typeface="Cambria Math" panose="02040503050406030204" pitchFamily="18" charset="0"/>
+                        </a:rPr>
                         <m:t>=</m:t>
                       </m:r>
                       <m:d>
@@ -8832,7 +8884,9 @@
                         </m:e>
                       </m:d>
                       <m:r>
-                        <a:rPr lang="ro-RO" sz="1600" i="1"/>
+                        <a:rPr lang="ro-RO" sz="1600" i="1">
+                          <a:latin typeface="Cambria Math" panose="02040503050406030204" pitchFamily="18" charset="0"/>
+                        </a:rPr>
                         <m:t>= </m:t>
                       </m:r>
                       <m:d>
@@ -8840,66 +8894,88 @@
                           <m:begChr m:val="{"/>
                           <m:endChr m:val=""/>
                           <m:ctrlPr>
-                            <a:rPr lang="ro-RO" sz="1600" i="1"/>
+                            <a:rPr lang="ro-RO" sz="1600" i="1">
+                              <a:latin typeface="Cambria Math" panose="02040503050406030204" pitchFamily="18" charset="0"/>
+                            </a:rPr>
                           </m:ctrlPr>
                         </m:dPr>
                         <m:e>
                           <m:eqArr>
                             <m:eqArrPr>
                               <m:ctrlPr>
-                                <a:rPr lang="ro-RO" sz="1600" i="1"/>
+                                <a:rPr lang="ro-RO" sz="1600" i="1">
+                                  <a:latin typeface="Cambria Math" panose="02040503050406030204" pitchFamily="18" charset="0"/>
+                                </a:rPr>
                               </m:ctrlPr>
                             </m:eqArrPr>
                             <m:e>
                               <m:sSub>
                                 <m:sSubPr>
                                   <m:ctrlPr>
-                                    <a:rPr lang="ro-RO" sz="1600" i="1"/>
+                                    <a:rPr lang="ro-RO" sz="1600" i="1">
+                                      <a:latin typeface="Cambria Math" panose="02040503050406030204" pitchFamily="18" charset="0"/>
+                                    </a:rPr>
                                   </m:ctrlPr>
                                 </m:sSubPr>
                                 <m:e>
                                   <m:r>
-                                    <a:rPr lang="ro-RO" sz="1600" i="1"/>
+                                    <a:rPr lang="ro-RO" sz="1600" i="1">
+                                      <a:latin typeface="Cambria Math" panose="02040503050406030204" pitchFamily="18" charset="0"/>
+                                    </a:rPr>
                                     <m:t>𝑔</m:t>
                                   </m:r>
                                 </m:e>
                                 <m:sub>
                                   <m:r>
-                                    <a:rPr lang="ro-RO" sz="1600" i="1"/>
+                                    <a:rPr lang="ro-RO" sz="1600" i="1">
+                                      <a:latin typeface="Cambria Math" panose="02040503050406030204" pitchFamily="18" charset="0"/>
+                                    </a:rPr>
                                     <m:t>𝑖</m:t>
                                   </m:r>
                                 </m:sub>
                               </m:sSub>
                               <m:r>
-                                <a:rPr lang="ro-RO" sz="1600" i="1"/>
+                                <a:rPr lang="ro-RO" sz="1600" i="1">
+                                  <a:latin typeface="Cambria Math" panose="02040503050406030204" pitchFamily="18" charset="0"/>
+                                </a:rPr>
                                 <m:t>−</m:t>
                               </m:r>
                               <m:r>
-                                <a:rPr lang="ro-RO" sz="1600" i="1"/>
+                                <a:rPr lang="ro-RO" sz="1600" i="1">
+                                  <a:latin typeface="Cambria Math" panose="02040503050406030204" pitchFamily="18" charset="0"/>
+                                </a:rPr>
                                 <m:t>𝑐𝑒𝑖𝑙</m:t>
                               </m:r>
                               <m:d>
                                 <m:dPr>
                                   <m:ctrlPr>
-                                    <a:rPr lang="ro-RO" sz="1600" i="1"/>
+                                    <a:rPr lang="ro-RO" sz="1600" i="1">
+                                      <a:latin typeface="Cambria Math" panose="02040503050406030204" pitchFamily="18" charset="0"/>
+                                    </a:rPr>
                                   </m:ctrlPr>
                                 </m:dPr>
                                 <m:e>
                                   <m:f>
                                     <m:fPr>
                                       <m:ctrlPr>
-                                        <a:rPr lang="ro-RO" sz="1600" i="1"/>
+                                        <a:rPr lang="ro-RO" sz="1600" i="1">
+                                          <a:latin typeface="Cambria Math" panose="02040503050406030204" pitchFamily="18" charset="0"/>
+                                        </a:rPr>
                                       </m:ctrlPr>
                                     </m:fPr>
                                     <m:num>
                                       <m:r>
-                                        <a:rPr lang="ro-RO" sz="1600" i="1"/>
+                                        <a:rPr lang="ro-RO" sz="1600" i="1">
+                                          <a:latin typeface="Cambria Math" panose="02040503050406030204" pitchFamily="18" charset="0"/>
+                                        </a:rPr>
                                         <m:t>𝑚</m:t>
                                       </m:r>
                                     </m:num>
                                     <m:den>
                                       <m:r>
-                                        <a:rPr lang="ro-RO" sz="1600" i="1"/>
+                                        <a:rPr lang="ro-RO" sz="1600" i="1">
+                                          <a:latin typeface="Cambria Math" panose="02040503050406030204" pitchFamily="18" charset="0"/>
+                                        </a:rPr>
                                         <m:t>2</m:t>
                                       </m:r>
                                     </m:den>
@@ -8907,62 +8983,84 @@
                                 </m:e>
                               </m:d>
                               <m:r>
-                                <a:rPr lang="ro-RO" sz="1600" i="1"/>
+                                <a:rPr lang="ro-RO" sz="1600" i="1">
+                                  <a:latin typeface="Cambria Math" panose="02040503050406030204" pitchFamily="18" charset="0"/>
+                                </a:rPr>
                                 <m:t>, </m:t>
                               </m:r>
                               <m:sSub>
                                 <m:sSubPr>
                                   <m:ctrlPr>
-                                    <a:rPr lang="ro-RO" sz="1600" i="1"/>
+                                    <a:rPr lang="ro-RO" sz="1600" i="1">
+                                      <a:latin typeface="Cambria Math" panose="02040503050406030204" pitchFamily="18" charset="0"/>
+                                    </a:rPr>
                                   </m:ctrlPr>
                                 </m:sSubPr>
                                 <m:e>
                                   <m:r>
-                                    <a:rPr lang="ro-RO" sz="1600" i="1"/>
+                                    <a:rPr lang="ro-RO" sz="1600" i="1">
+                                      <a:latin typeface="Cambria Math" panose="02040503050406030204" pitchFamily="18" charset="0"/>
+                                    </a:rPr>
                                     <m:t>𝑔</m:t>
                                   </m:r>
                                 </m:e>
                                 <m:sub>
                                   <m:r>
-                                    <a:rPr lang="ro-RO" sz="1600" i="1"/>
+                                    <a:rPr lang="ro-RO" sz="1600" i="1">
+                                      <a:latin typeface="Cambria Math" panose="02040503050406030204" pitchFamily="18" charset="0"/>
+                                    </a:rPr>
                                     <m:t>𝑖</m:t>
                                   </m:r>
                                   <m:r>
-                                    <a:rPr lang="ro-RO" sz="1600" i="1"/>
+                                    <a:rPr lang="ro-RO" sz="1600" i="1">
+                                      <a:latin typeface="Cambria Math" panose="02040503050406030204" pitchFamily="18" charset="0"/>
+                                    </a:rPr>
                                     <m:t>+1</m:t>
                                   </m:r>
                                 </m:sub>
                               </m:sSub>
                               <m:r>
-                                <a:rPr lang="ro-RO" sz="1600" i="1"/>
+                                <a:rPr lang="ro-RO" sz="1600" i="1">
+                                  <a:latin typeface="Cambria Math" panose="02040503050406030204" pitchFamily="18" charset="0"/>
+                                </a:rPr>
                                 <m:t>+</m:t>
                               </m:r>
                               <m:r>
-                                <a:rPr lang="ro-RO" sz="1600" i="1"/>
+                                <a:rPr lang="ro-RO" sz="1600" i="1">
+                                  <a:latin typeface="Cambria Math" panose="02040503050406030204" pitchFamily="18" charset="0"/>
+                                </a:rPr>
                                 <m:t>𝑓𝑙𝑜𝑜𝑟</m:t>
                               </m:r>
                               <m:d>
                                 <m:dPr>
                                   <m:ctrlPr>
-                                    <a:rPr lang="ro-RO" sz="1600" i="1"/>
+                                    <a:rPr lang="ro-RO" sz="1600" i="1">
+                                      <a:latin typeface="Cambria Math" panose="02040503050406030204" pitchFamily="18" charset="0"/>
+                                    </a:rPr>
                                   </m:ctrlPr>
                                 </m:dPr>
                                 <m:e>
                                   <m:f>
                                     <m:fPr>
                                       <m:ctrlPr>
-                                        <a:rPr lang="ro-RO" sz="1600" i="1"/>
+                                        <a:rPr lang="ro-RO" sz="1600" i="1">
+                                          <a:latin typeface="Cambria Math" panose="02040503050406030204" pitchFamily="18" charset="0"/>
+                                        </a:rPr>
                                       </m:ctrlPr>
                                     </m:fPr>
                                     <m:num>
                                       <m:r>
-                                        <a:rPr lang="ro-RO" sz="1600" i="1"/>
+                                        <a:rPr lang="ro-RO" sz="1600" i="1">
+                                          <a:latin typeface="Cambria Math" panose="02040503050406030204" pitchFamily="18" charset="0"/>
+                                        </a:rPr>
                                         <m:t>𝑚</m:t>
                                       </m:r>
                                     </m:num>
                                     <m:den>
                                       <m:r>
-                                        <a:rPr lang="ro-RO" sz="1600" i="1"/>
+                                        <a:rPr lang="ro-RO" sz="1600" i="1">
+                                          <a:latin typeface="Cambria Math" panose="02040503050406030204" pitchFamily="18" charset="0"/>
+                                        </a:rPr>
                                         <m:t>2</m:t>
                                       </m:r>
                                     </m:den>
@@ -8970,27 +9068,39 @@
                                 </m:e>
                               </m:d>
                               <m:r>
-                                <a:rPr lang="ro-RO" sz="1600" i="1"/>
+                                <a:rPr lang="ro-RO" sz="1600" i="1">
+                                  <a:latin typeface="Cambria Math" panose="02040503050406030204" pitchFamily="18" charset="0"/>
+                                </a:rPr>
                                 <m:t>, </m:t>
                               </m:r>
                               <m:r>
-                                <a:rPr lang="ro-RO" sz="1600" i="1"/>
+                                <a:rPr lang="ro-RO" sz="1600" i="1">
+                                  <a:latin typeface="Cambria Math" panose="02040503050406030204" pitchFamily="18" charset="0"/>
+                                </a:rPr>
                                 <m:t>𝑝𝑒𝑛𝑡𝑟𝑢</m:t>
                               </m:r>
                               <m:r>
-                                <a:rPr lang="ro-RO" sz="1600" i="1"/>
+                                <a:rPr lang="ro-RO" sz="1600" i="1">
+                                  <a:latin typeface="Cambria Math" panose="02040503050406030204" pitchFamily="18" charset="0"/>
+                                </a:rPr>
                                 <m:t> </m:t>
                               </m:r>
                               <m:r>
-                                <a:rPr lang="ro-RO" sz="1600" i="1"/>
+                                <a:rPr lang="ro-RO" sz="1600" i="1">
+                                  <a:latin typeface="Cambria Math" panose="02040503050406030204" pitchFamily="18" charset="0"/>
+                                </a:rPr>
                                 <m:t>𝑑</m:t>
                               </m:r>
                               <m:r>
-                                <a:rPr lang="ro-RO" sz="1600" i="1"/>
+                                <a:rPr lang="ro-RO" sz="1600" i="1">
+                                  <a:latin typeface="Cambria Math" panose="02040503050406030204" pitchFamily="18" charset="0"/>
+                                </a:rPr>
                                 <m:t> </m:t>
                               </m:r>
                               <m:r>
-                                <a:rPr lang="ro-RO" sz="1600" i="1"/>
+                                <a:rPr lang="ro-RO" sz="1600" i="1">
+                                  <a:latin typeface="Cambria Math" panose="02040503050406030204" pitchFamily="18" charset="0"/>
+                                </a:rPr>
                                 <m:t>𝑖𝑚𝑝𝑎𝑟</m:t>
                               </m:r>
                             </m:e>
@@ -8998,52 +9108,70 @@
                               <m:sSub>
                                 <m:sSubPr>
                                   <m:ctrlPr>
-                                    <a:rPr lang="ro-RO" sz="1600" i="1"/>
+                                    <a:rPr lang="ro-RO" sz="1600" i="1">
+                                      <a:latin typeface="Cambria Math" panose="02040503050406030204" pitchFamily="18" charset="0"/>
+                                    </a:rPr>
                                   </m:ctrlPr>
                                 </m:sSubPr>
                                 <m:e>
                                   <m:r>
-                                    <a:rPr lang="ro-RO" sz="1600" i="1"/>
+                                    <a:rPr lang="ro-RO" sz="1600" i="1">
+                                      <a:latin typeface="Cambria Math" panose="02040503050406030204" pitchFamily="18" charset="0"/>
+                                    </a:rPr>
                                     <m:t>𝑔</m:t>
                                   </m:r>
                                 </m:e>
                                 <m:sub>
                                   <m:r>
-                                    <a:rPr lang="ro-RO" sz="1600" i="1"/>
+                                    <a:rPr lang="ro-RO" sz="1600" i="1">
+                                      <a:latin typeface="Cambria Math" panose="02040503050406030204" pitchFamily="18" charset="0"/>
+                                    </a:rPr>
                                     <m:t>𝑖</m:t>
                                   </m:r>
                                 </m:sub>
                               </m:sSub>
                               <m:r>
-                                <a:rPr lang="ro-RO" sz="1600" i="1"/>
+                                <a:rPr lang="ro-RO" sz="1600" i="1">
+                                  <a:latin typeface="Cambria Math" panose="02040503050406030204" pitchFamily="18" charset="0"/>
+                                </a:rPr>
                                 <m:t>−</m:t>
                               </m:r>
                               <m:r>
-                                <a:rPr lang="ro-RO" sz="1600" i="1"/>
+                                <a:rPr lang="ro-RO" sz="1600" i="1">
+                                  <a:latin typeface="Cambria Math" panose="02040503050406030204" pitchFamily="18" charset="0"/>
+                                </a:rPr>
                                 <m:t>𝑓𝑙𝑜𝑜𝑟</m:t>
                               </m:r>
                               <m:d>
                                 <m:dPr>
                                   <m:ctrlPr>
-                                    <a:rPr lang="ro-RO" sz="1600" i="1"/>
+                                    <a:rPr lang="ro-RO" sz="1600" i="1">
+                                      <a:latin typeface="Cambria Math" panose="02040503050406030204" pitchFamily="18" charset="0"/>
+                                    </a:rPr>
                                   </m:ctrlPr>
                                 </m:dPr>
                                 <m:e>
                                   <m:f>
                                     <m:fPr>
                                       <m:ctrlPr>
-                                        <a:rPr lang="ro-RO" sz="1600" i="1"/>
+                                        <a:rPr lang="ro-RO" sz="1600" i="1">
+                                          <a:latin typeface="Cambria Math" panose="02040503050406030204" pitchFamily="18" charset="0"/>
+                                        </a:rPr>
                                       </m:ctrlPr>
                                     </m:fPr>
                                     <m:num>
                                       <m:r>
-                                        <a:rPr lang="ro-RO" sz="1600" i="1"/>
+                                        <a:rPr lang="ro-RO" sz="1600" i="1">
+                                          <a:latin typeface="Cambria Math" panose="02040503050406030204" pitchFamily="18" charset="0"/>
+                                        </a:rPr>
                                         <m:t>𝑚</m:t>
                                       </m:r>
                                     </m:num>
                                     <m:den>
                                       <m:r>
-                                        <a:rPr lang="ro-RO" sz="1600" i="1"/>
+                                        <a:rPr lang="ro-RO" sz="1600" i="1">
+                                          <a:latin typeface="Cambria Math" panose="02040503050406030204" pitchFamily="18" charset="0"/>
+                                        </a:rPr>
                                         <m:t>2</m:t>
                                       </m:r>
                                     </m:den>
@@ -9051,62 +9179,84 @@
                                 </m:e>
                               </m:d>
                               <m:r>
-                                <a:rPr lang="ro-RO" sz="1600" i="1"/>
+                                <a:rPr lang="ro-RO" sz="1600" i="1">
+                                  <a:latin typeface="Cambria Math" panose="02040503050406030204" pitchFamily="18" charset="0"/>
+                                </a:rPr>
                                 <m:t>, </m:t>
                               </m:r>
                               <m:sSub>
                                 <m:sSubPr>
                                   <m:ctrlPr>
-                                    <a:rPr lang="ro-RO" sz="1600" i="1"/>
+                                    <a:rPr lang="ro-RO" sz="1600" i="1">
+                                      <a:latin typeface="Cambria Math" panose="02040503050406030204" pitchFamily="18" charset="0"/>
+                                    </a:rPr>
                                   </m:ctrlPr>
                                 </m:sSubPr>
                                 <m:e>
                                   <m:r>
-                                    <a:rPr lang="ro-RO" sz="1600" i="1"/>
+                                    <a:rPr lang="ro-RO" sz="1600" i="1">
+                                      <a:latin typeface="Cambria Math" panose="02040503050406030204" pitchFamily="18" charset="0"/>
+                                    </a:rPr>
                                     <m:t>𝑔</m:t>
                                   </m:r>
                                 </m:e>
                                 <m:sub>
                                   <m:r>
-                                    <a:rPr lang="ro-RO" sz="1600" i="1"/>
+                                    <a:rPr lang="ro-RO" sz="1600" i="1">
+                                      <a:latin typeface="Cambria Math" panose="02040503050406030204" pitchFamily="18" charset="0"/>
+                                    </a:rPr>
                                     <m:t>𝑖</m:t>
                                   </m:r>
                                   <m:r>
-                                    <a:rPr lang="ro-RO" sz="1600" i="1"/>
+                                    <a:rPr lang="ro-RO" sz="1600" i="1">
+                                      <a:latin typeface="Cambria Math" panose="02040503050406030204" pitchFamily="18" charset="0"/>
+                                    </a:rPr>
                                     <m:t>+1</m:t>
                                   </m:r>
                                 </m:sub>
                               </m:sSub>
                               <m:r>
-                                <a:rPr lang="ro-RO" sz="1600" i="1"/>
+                                <a:rPr lang="ro-RO" sz="1600" i="1">
+                                  <a:latin typeface="Cambria Math" panose="02040503050406030204" pitchFamily="18" charset="0"/>
+                                </a:rPr>
                                 <m:t>+</m:t>
                               </m:r>
                               <m:r>
-                                <a:rPr lang="ro-RO" sz="1600" i="1"/>
+                                <a:rPr lang="ro-RO" sz="1600" i="1">
+                                  <a:latin typeface="Cambria Math" panose="02040503050406030204" pitchFamily="18" charset="0"/>
+                                </a:rPr>
                                 <m:t>𝑐𝑒𝑖𝑙</m:t>
                               </m:r>
                               <m:d>
                                 <m:dPr>
                                   <m:ctrlPr>
-                                    <a:rPr lang="ro-RO" sz="1600" i="1"/>
+                                    <a:rPr lang="ro-RO" sz="1600" i="1">
+                                      <a:latin typeface="Cambria Math" panose="02040503050406030204" pitchFamily="18" charset="0"/>
+                                    </a:rPr>
                                   </m:ctrlPr>
                                 </m:dPr>
                                 <m:e>
                                   <m:f>
                                     <m:fPr>
                                       <m:ctrlPr>
-                                        <a:rPr lang="ro-RO" sz="1600" i="1"/>
+                                        <a:rPr lang="ro-RO" sz="1600" i="1">
+                                          <a:latin typeface="Cambria Math" panose="02040503050406030204" pitchFamily="18" charset="0"/>
+                                        </a:rPr>
                                       </m:ctrlPr>
                                     </m:fPr>
                                     <m:num>
                                       <m:r>
-                                        <a:rPr lang="ro-RO" sz="1600" i="1"/>
+                                        <a:rPr lang="ro-RO" sz="1600" i="1">
+                                          <a:latin typeface="Cambria Math" panose="02040503050406030204" pitchFamily="18" charset="0"/>
+                                        </a:rPr>
                                         <m:t>𝑚</m:t>
                                       </m:r>
                                     </m:num>
                                     <m:den>
                                       <m:r>
-                                        <a:rPr lang="ro-RO" sz="1600" i="1"/>
+                                        <a:rPr lang="ro-RO" sz="1600" i="1">
+                                          <a:latin typeface="Cambria Math" panose="02040503050406030204" pitchFamily="18" charset="0"/>
+                                        </a:rPr>
                                         <m:t>2</m:t>
                                       </m:r>
                                     </m:den>
@@ -9114,27 +9264,39 @@
                                 </m:e>
                               </m:d>
                               <m:r>
-                                <a:rPr lang="ro-RO" sz="1600" i="1"/>
+                                <a:rPr lang="ro-RO" sz="1600" i="1">
+                                  <a:latin typeface="Cambria Math" panose="02040503050406030204" pitchFamily="18" charset="0"/>
+                                </a:rPr>
                                 <m:t>, </m:t>
                               </m:r>
                               <m:r>
-                                <a:rPr lang="ro-RO" sz="1600" i="1"/>
+                                <a:rPr lang="ro-RO" sz="1600" i="1">
+                                  <a:latin typeface="Cambria Math" panose="02040503050406030204" pitchFamily="18" charset="0"/>
+                                </a:rPr>
                                 <m:t>𝑝𝑒𝑛𝑡𝑟𝑢</m:t>
                               </m:r>
                               <m:r>
-                                <a:rPr lang="ro-RO" sz="1600" i="1"/>
+                                <a:rPr lang="ro-RO" sz="1600" i="1">
+                                  <a:latin typeface="Cambria Math" panose="02040503050406030204" pitchFamily="18" charset="0"/>
+                                </a:rPr>
                                 <m:t> </m:t>
                               </m:r>
                               <m:r>
-                                <a:rPr lang="ro-RO" sz="1600" i="1"/>
+                                <a:rPr lang="ro-RO" sz="1600" i="1">
+                                  <a:latin typeface="Cambria Math" panose="02040503050406030204" pitchFamily="18" charset="0"/>
+                                </a:rPr>
                                 <m:t>𝑑</m:t>
                               </m:r>
                               <m:r>
-                                <a:rPr lang="ro-RO" sz="1600" i="1"/>
+                                <a:rPr lang="ro-RO" sz="1600" i="1">
+                                  <a:latin typeface="Cambria Math" panose="02040503050406030204" pitchFamily="18" charset="0"/>
+                                </a:rPr>
                                 <m:t> </m:t>
                               </m:r>
                               <m:r>
-                                <a:rPr lang="ro-RO" sz="1600" i="1"/>
+                                <a:rPr lang="ro-RO" sz="1600" i="1">
+                                  <a:latin typeface="Cambria Math" panose="02040503050406030204" pitchFamily="18" charset="0"/>
+                                </a:rPr>
                                 <m:t>𝑝𝑎𝑟</m:t>
                               </m:r>
                             </m:e>
@@ -9163,27 +9325,39 @@
                     </m:oMathParaPr>
                     <m:oMath xmlns:m="http://schemas.openxmlformats.org/officeDocument/2006/math">
                       <m:r>
-                        <a:rPr lang="ro-RO" sz="1600" i="1"/>
+                        <a:rPr lang="ro-RO" sz="1600" i="1">
+                          <a:latin typeface="Cambria Math" panose="02040503050406030204" pitchFamily="18" charset="0"/>
+                        </a:rPr>
                         <m:t>𝑚</m:t>
                       </m:r>
                       <m:r>
-                        <a:rPr lang="ro-RO" sz="1600" i="1"/>
+                        <a:rPr lang="ro-RO" sz="1600" i="1">
+                          <a:latin typeface="Cambria Math" panose="02040503050406030204" pitchFamily="18" charset="0"/>
+                        </a:rPr>
                         <m:t>=</m:t>
                       </m:r>
                       <m:r>
-                        <a:rPr lang="ro-RO" sz="1600" i="1"/>
+                        <a:rPr lang="ro-RO" sz="1600" i="1">
+                          <a:latin typeface="Cambria Math" panose="02040503050406030204" pitchFamily="18" charset="0"/>
+                        </a:rPr>
                         <m:t>𝑑</m:t>
                       </m:r>
                       <m:r>
-                        <a:rPr lang="ro-RO" sz="1600" i="1"/>
+                        <a:rPr lang="ro-RO" sz="1600" i="1">
+                          <a:latin typeface="Cambria Math" panose="02040503050406030204" pitchFamily="18" charset="0"/>
+                        </a:rPr>
                         <m:t>−</m:t>
                       </m:r>
                       <m:r>
-                        <a:rPr lang="ro-RO" sz="1600" i="1"/>
+                        <a:rPr lang="ro-RO" sz="1600" i="1">
+                          <a:latin typeface="Cambria Math" panose="02040503050406030204" pitchFamily="18" charset="0"/>
+                        </a:rPr>
                         <m:t>𝑑</m:t>
                       </m:r>
                       <m:r>
-                        <a:rPr lang="ro-RO" sz="1600" i="1"/>
+                        <a:rPr lang="ro-RO" sz="1600" i="1">
+                          <a:latin typeface="Cambria Math" panose="02040503050406030204" pitchFamily="18" charset="0"/>
+                        </a:rPr>
                         <m:t>′</m:t>
                       </m:r>
                     </m:oMath>
@@ -9194,7 +9368,7 @@
             </p:txBody>
           </p:sp>
         </mc:Choice>
-        <mc:Fallback>
+        <mc:Fallback xmlns="">
           <p:sp>
             <p:nvSpPr>
               <p:cNvPr id="3" name="Content Placeholder 2"/>
@@ -9289,8 +9463,8 @@
           </a:p>
         </p:txBody>
       </p:sp>
-      <mc:AlternateContent xmlns:mc="http://schemas.openxmlformats.org/markup-compatibility/2006">
-        <mc:Choice xmlns:a14="http://schemas.microsoft.com/office/drawing/2010/main" Requires="a14">
+      <mc:AlternateContent xmlns:mc="http://schemas.openxmlformats.org/markup-compatibility/2006" xmlns:a14="http://schemas.microsoft.com/office/drawing/2010/main">
+        <mc:Choice Requires="a14">
           <p:sp>
             <p:nvSpPr>
               <p:cNvPr id="3" name="Content Placeholder 2"/>
@@ -9671,7 +9845,7 @@
             </p:txBody>
           </p:sp>
         </mc:Choice>
-        <mc:Fallback>
+        <mc:Fallback xmlns="">
           <p:sp>
             <p:nvSpPr>
               <p:cNvPr id="3" name="Content Placeholder 2"/>
@@ -10196,7 +10370,12 @@
             <p:ph type="title"/>
           </p:nvPr>
         </p:nvSpPr>
-        <p:spPr/>
+        <p:spPr>
+          <a:xfrm>
+            <a:off x="252919" y="1123837"/>
+            <a:ext cx="2947482" cy="4601183"/>
+          </a:xfrm>
+        </p:spPr>
         <p:txBody>
           <a:bodyPr/>
           <a:lstStyle/>
@@ -10223,7 +10402,12 @@
             <p:ph idx="1"/>
           </p:nvPr>
         </p:nvSpPr>
-        <p:spPr/>
+        <p:spPr>
+          <a:xfrm>
+            <a:off x="3869268" y="864108"/>
+            <a:ext cx="7315200" cy="5120640"/>
+          </a:xfrm>
+        </p:spPr>
         <p:txBody>
           <a:bodyPr/>
           <a:lstStyle/>
@@ -10242,11 +10426,35 @@
           <a:p>
             <a:r>
               <a:rPr lang="ro-RO" dirty="0" smtClean="0"/>
-              <a:t>Algoritmul lui Canny are ca parametri pragul superior și pragul inferior (după care se selectează muchiile) și lățimea matricei </a:t>
+              <a:t>Algoritmul lui Canny are ca parametri pragul superior și pragul inferior (după care se selectează muchiile) și </a:t>
+            </a:r>
+            <a:r>
+              <a:rPr lang="en-GB" dirty="0" err="1" smtClean="0"/>
+              <a:t>dimensiunea</a:t>
+            </a:r>
+            <a:r>
+              <a:rPr lang="en-GB" dirty="0" smtClean="0"/>
+              <a:t> </a:t>
+            </a:r>
+            <a:r>
+              <a:rPr lang="en-GB" dirty="0" err="1" smtClean="0"/>
+              <a:t>filtrului</a:t>
+            </a:r>
+            <a:r>
+              <a:rPr lang="en-GB" dirty="0" smtClean="0"/>
+              <a:t> </a:t>
             </a:r>
             <a:r>
               <a:rPr lang="ro-RO" dirty="0" smtClean="0"/>
-              <a:t>Gaussiene</a:t>
+              <a:t>Gaussi</a:t>
+            </a:r>
+            <a:r>
+              <a:rPr lang="en-GB" dirty="0" smtClean="0"/>
+              <a:t>a</a:t>
+            </a:r>
+            <a:r>
+              <a:rPr lang="ro-RO" dirty="0" smtClean="0"/>
+              <a:t>n</a:t>
             </a:r>
             <a:endParaRPr lang="en-GB" dirty="0" smtClean="0"/>
           </a:p>
@@ -10263,7 +10471,6 @@
               <a:rPr lang="ro-RO" dirty="0" smtClean="0"/>
               <a:t>ă o mască asupra imaginii (în funcție de căți LSB folosim) </a:t>
             </a:r>
-            <a:endParaRPr lang="ro-RO" dirty="0" smtClean="0"/>
           </a:p>
           <a:p>
             <a:endParaRPr lang="ro-RO" dirty="0" smtClean="0"/>
@@ -10337,8 +10544,8 @@
           </a:p>
         </p:txBody>
       </p:sp>
-      <mc:AlternateContent xmlns:mc="http://schemas.openxmlformats.org/markup-compatibility/2006">
-        <mc:Choice xmlns:a14="http://schemas.microsoft.com/office/drawing/2010/main" Requires="a14">
+      <mc:AlternateContent xmlns:mc="http://schemas.openxmlformats.org/markup-compatibility/2006" xmlns:a14="http://schemas.microsoft.com/office/drawing/2010/main">
+        <mc:Choice Requires="a14">
           <p:sp>
             <p:nvSpPr>
               <p:cNvPr id="3" name="Content Placeholder 2"/>
@@ -11042,7 +11249,7 @@
             </p:txBody>
           </p:sp>
         </mc:Choice>
-        <mc:Fallback>
+        <mc:Fallback xmlns="">
           <p:sp>
             <p:nvSpPr>
               <p:cNvPr id="3" name="Content Placeholder 2"/>
@@ -11169,30 +11376,36 @@
             </a:r>
             <a:r>
               <a:rPr lang="ro-RO" dirty="0" smtClean="0"/>
-              <a:t>, aplic Canny pentru a obține muchiile în care încorporăm</a:t>
-            </a:r>
-            <a:endParaRPr lang="ro-RO" dirty="0" smtClean="0"/>
-          </a:p>
-          <a:p>
+              <a:t>, </a:t>
+            </a:r>
             <a:r>
               <a:rPr lang="ro-RO" dirty="0" smtClean="0"/>
-              <a:t>Algoritmul </a:t>
+              <a:t>aplic</a:t>
             </a:r>
             <a:r>
               <a:rPr lang="ro-RO" dirty="0" smtClean="0"/>
-              <a:t>implică și utilizarea unei ”stego-chei”, cu ajutorul căreia se modifică ordinea în care sunt folosiți pixelii pentru încorporare</a:t>
-            </a:r>
-          </a:p>
-          <a:p>
+              <a:t>ăm</a:t>
+            </a:r>
             <a:r>
               <a:rPr lang="ro-RO" dirty="0" smtClean="0"/>
-              <a:t>Fiindcă receptorul nu are la îndemână pragul și lățimea utilizate, acestea sunt introduse în alte părți ale </a:t>
+              <a:t> </a:t>
             </a:r>
             <a:r>
               <a:rPr lang="ro-RO" dirty="0" smtClean="0"/>
-              <a:t>imaginii (dar nu în muchii)</a:t>
-            </a:r>
-            <a:endParaRPr lang="ro-RO" dirty="0" smtClean="0"/>
+              <a:t>Canny pentru a obține muchiile în care încorporăm</a:t>
+            </a:r>
+          </a:p>
+          <a:p>
+            <a:r>
+              <a:rPr lang="ro-RO" dirty="0" smtClean="0"/>
+              <a:t>Algoritmul implică și utilizarea unei ”stego-chei”, cu ajutorul căreia se modifică ordinea în care sunt folosiți pixelii pentru încorporare</a:t>
+            </a:r>
+          </a:p>
+          <a:p>
+            <a:r>
+              <a:rPr lang="ro-RO" dirty="0" smtClean="0"/>
+              <a:t>Fiindcă receptorul nu are la îndemână pragul și lățimea utilizate, acestea sunt introduse în alte părți ale imaginii (dar nu în muchii)</a:t>
+            </a:r>
           </a:p>
           <a:p>
             <a:r>
@@ -11613,13 +11826,8 @@
           <a:p>
             <a:r>
               <a:rPr lang="ro-RO" dirty="0" smtClean="0"/>
-              <a:t>Aplică transformata Cosinus Discretă pe blocuri de dimensiune 8 * 8 din </a:t>
-            </a:r>
-            <a:r>
-              <a:rPr lang="ro-RO" dirty="0" smtClean="0"/>
-              <a:t>imagine</a:t>
-            </a:r>
-            <a:endParaRPr lang="ro-RO" dirty="0" smtClean="0"/>
+              <a:t>Aplică transformata Cosinus Discretă pe blocuri de dimensiune 8 * 8 din imagine</a:t>
+            </a:r>
           </a:p>
           <a:p>
             <a:r>
@@ -11717,23 +11925,7 @@
           <a:p>
             <a:r>
               <a:rPr lang="ro-RO" dirty="0" smtClean="0"/>
-              <a:t>Algoritmul poate fi </a:t>
-            </a:r>
-            <a:r>
-              <a:rPr lang="ro-RO" dirty="0" smtClean="0"/>
-              <a:t>schimbat</a:t>
-            </a:r>
-            <a:r>
-              <a:rPr lang="ro-RO" dirty="0" smtClean="0"/>
-              <a:t> </a:t>
-            </a:r>
-            <a:r>
-              <a:rPr lang="ro-RO" dirty="0" smtClean="0"/>
-              <a:t>pentru a folosi un număr diferit de coeficienți, în funcție de dimensiunea </a:t>
-            </a:r>
-            <a:r>
-              <a:rPr lang="ro-RO" dirty="0" smtClean="0"/>
-              <a:t>mesajului</a:t>
+              <a:t>Algoritmul poate fi schimbat pentru a folosi un număr diferit de coeficienți, în funcție de dimensiunea mesajului</a:t>
             </a:r>
           </a:p>
           <a:p>

</xml_diff>